<commit_message>
Final versions of ppt and report for submission 8/4
</commit_message>
<xml_diff>
--- a/Customer Segmentation - Statistics Term Project Presentation - Team 5 - V2.pptx
+++ b/Customer Segmentation - Statistics Term Project Presentation - Team 5 - V2.pptx
@@ -248,7 +248,7 @@
           <a:p>
             <a:fld id="{EF1077DB-935E-4A0A-947A-D283B9F9F452}" type="datetimeFigureOut">
               <a:rPr lang="en-US" smtClean="0"/>
-              <a:t>8/1/2019</a:t>
+              <a:t>8/4/2019</a:t>
             </a:fld>
             <a:endParaRPr lang="en-US"/>
           </a:p>
@@ -425,7 +425,7 @@
           <a:p>
             <a:fld id="{2D9EC30E-1A71-4188-9BE7-E2A64929A436}" type="datetimeFigureOut">
               <a:rPr lang="en-US" noProof="0" smtClean="0"/>
-              <a:t>8/1/2019</a:t>
+              <a:t>8/4/2019</a:t>
             </a:fld>
             <a:endParaRPr lang="en-US" noProof="0"/>
           </a:p>
@@ -23196,1296 +23196,6 @@
       </p:sp>
       <p:sp>
         <p:nvSpPr>
-          <p:cNvPr id="8" name="Text Placeholder 3">
-            <a:extLst>
-              <a:ext uri="{FF2B5EF4-FFF2-40B4-BE49-F238E27FC236}">
-                <a16:creationId xmlns:a16="http://schemas.microsoft.com/office/drawing/2014/main" id="{6419BC7E-1BE3-4410-A750-1E076BEF3899}"/>
-              </a:ext>
-            </a:extLst>
-          </p:cNvPr>
-          <p:cNvSpPr txBox="1">
-            <a:spLocks/>
-          </p:cNvSpPr>
-          <p:nvPr/>
-        </p:nvSpPr>
-        <p:spPr>
-          <a:xfrm>
-            <a:off x="8034849" y="3859066"/>
-            <a:ext cx="3521514" cy="288000"/>
-          </a:xfrm>
-          <a:prstGeom prst="rect">
-            <a:avLst/>
-          </a:prstGeom>
-        </p:spPr>
-        <p:txBody>
-          <a:bodyPr/>
-          <a:lstStyle>
-            <a:lvl1pPr marL="266700" indent="-266700" algn="l" defTabSz="914400" rtl="0" eaLnBrk="1" latinLnBrk="0" hangingPunct="1">
-              <a:lnSpc>
-                <a:spcPct val="90000"/>
-              </a:lnSpc>
-              <a:spcBef>
-                <a:spcPts val="1000"/>
-              </a:spcBef>
-              <a:buFont typeface="Arial" panose="020B0604020202020204" pitchFamily="34" charset="0"/>
-              <a:buChar char="•"/>
-              <a:defRPr sz="1800" kern="1200">
-                <a:solidFill>
-                  <a:schemeClr val="tx1">
-                    <a:lumMod val="75000"/>
-                    <a:lumOff val="25000"/>
-                  </a:schemeClr>
-                </a:solidFill>
-                <a:latin typeface="+mn-lt"/>
-                <a:ea typeface="+mn-ea"/>
-                <a:cs typeface="+mn-cs"/>
-              </a:defRPr>
-            </a:lvl1pPr>
-            <a:lvl2pPr marL="542925" indent="-276225" algn="l" defTabSz="914400" rtl="0" eaLnBrk="1" latinLnBrk="0" hangingPunct="1">
-              <a:lnSpc>
-                <a:spcPct val="90000"/>
-              </a:lnSpc>
-              <a:spcBef>
-                <a:spcPts val="500"/>
-              </a:spcBef>
-              <a:buFont typeface="Arial" panose="020B0604020202020204" pitchFamily="34" charset="0"/>
-              <a:buChar char="•"/>
-              <a:defRPr sz="1600" kern="1200">
-                <a:solidFill>
-                  <a:schemeClr val="tx1">
-                    <a:lumMod val="75000"/>
-                    <a:lumOff val="25000"/>
-                  </a:schemeClr>
-                </a:solidFill>
-                <a:latin typeface="+mn-lt"/>
-                <a:ea typeface="+mn-ea"/>
-                <a:cs typeface="+mn-cs"/>
-              </a:defRPr>
-            </a:lvl2pPr>
-            <a:lvl3pPr marL="809625" indent="-266700" algn="l" defTabSz="914400" rtl="0" eaLnBrk="1" latinLnBrk="0" hangingPunct="1">
-              <a:lnSpc>
-                <a:spcPct val="90000"/>
-              </a:lnSpc>
-              <a:spcBef>
-                <a:spcPts val="500"/>
-              </a:spcBef>
-              <a:buFont typeface="Arial" panose="020B0604020202020204" pitchFamily="34" charset="0"/>
-              <a:buChar char="•"/>
-              <a:defRPr sz="1400" kern="1200">
-                <a:solidFill>
-                  <a:schemeClr val="tx1">
-                    <a:lumMod val="75000"/>
-                    <a:lumOff val="25000"/>
-                  </a:schemeClr>
-                </a:solidFill>
-                <a:latin typeface="+mn-lt"/>
-                <a:ea typeface="+mn-ea"/>
-                <a:cs typeface="+mn-cs"/>
-              </a:defRPr>
-            </a:lvl3pPr>
-            <a:lvl4pPr marL="1076325" indent="-266700" algn="l" defTabSz="914400" rtl="0" eaLnBrk="1" latinLnBrk="0" hangingPunct="1">
-              <a:lnSpc>
-                <a:spcPct val="90000"/>
-              </a:lnSpc>
-              <a:spcBef>
-                <a:spcPts val="500"/>
-              </a:spcBef>
-              <a:buFont typeface="Arial" panose="020B0604020202020204" pitchFamily="34" charset="0"/>
-              <a:buChar char="•"/>
-              <a:defRPr sz="1400" kern="1200">
-                <a:solidFill>
-                  <a:schemeClr val="tx1">
-                    <a:lumMod val="75000"/>
-                    <a:lumOff val="25000"/>
-                  </a:schemeClr>
-                </a:solidFill>
-                <a:latin typeface="+mn-lt"/>
-                <a:ea typeface="+mn-ea"/>
-                <a:cs typeface="+mn-cs"/>
-              </a:defRPr>
-            </a:lvl4pPr>
-            <a:lvl5pPr marL="1343025" indent="-266700" algn="l" defTabSz="914400" rtl="0" eaLnBrk="1" latinLnBrk="0" hangingPunct="1">
-              <a:lnSpc>
-                <a:spcPct val="90000"/>
-              </a:lnSpc>
-              <a:spcBef>
-                <a:spcPts val="500"/>
-              </a:spcBef>
-              <a:buFont typeface="Arial" panose="020B0604020202020204" pitchFamily="34" charset="0"/>
-              <a:buChar char="•"/>
-              <a:defRPr sz="1400" kern="1200">
-                <a:solidFill>
-                  <a:schemeClr val="tx1">
-                    <a:lumMod val="75000"/>
-                    <a:lumOff val="25000"/>
-                  </a:schemeClr>
-                </a:solidFill>
-                <a:latin typeface="+mn-lt"/>
-                <a:ea typeface="+mn-ea"/>
-                <a:cs typeface="+mn-cs"/>
-              </a:defRPr>
-            </a:lvl5pPr>
-            <a:lvl6pPr marL="2514600" indent="-228600" algn="l" defTabSz="914400" rtl="0" eaLnBrk="1" latinLnBrk="0" hangingPunct="1">
-              <a:lnSpc>
-                <a:spcPct val="90000"/>
-              </a:lnSpc>
-              <a:spcBef>
-                <a:spcPts val="500"/>
-              </a:spcBef>
-              <a:buFont typeface="Arial" panose="020B0604020202020204" pitchFamily="34" charset="0"/>
-              <a:buChar char="•"/>
-              <a:defRPr sz="1800" kern="1200">
-                <a:solidFill>
-                  <a:schemeClr val="tx1"/>
-                </a:solidFill>
-                <a:latin typeface="+mn-lt"/>
-                <a:ea typeface="+mn-ea"/>
-                <a:cs typeface="+mn-cs"/>
-              </a:defRPr>
-            </a:lvl6pPr>
-            <a:lvl7pPr marL="2971800" indent="-228600" algn="l" defTabSz="914400" rtl="0" eaLnBrk="1" latinLnBrk="0" hangingPunct="1">
-              <a:lnSpc>
-                <a:spcPct val="90000"/>
-              </a:lnSpc>
-              <a:spcBef>
-                <a:spcPts val="500"/>
-              </a:spcBef>
-              <a:buFont typeface="Arial" panose="020B0604020202020204" pitchFamily="34" charset="0"/>
-              <a:buChar char="•"/>
-              <a:defRPr sz="1800" kern="1200">
-                <a:solidFill>
-                  <a:schemeClr val="tx1"/>
-                </a:solidFill>
-                <a:latin typeface="+mn-lt"/>
-                <a:ea typeface="+mn-ea"/>
-                <a:cs typeface="+mn-cs"/>
-              </a:defRPr>
-            </a:lvl7pPr>
-            <a:lvl8pPr marL="3429000" indent="-228600" algn="l" defTabSz="914400" rtl="0" eaLnBrk="1" latinLnBrk="0" hangingPunct="1">
-              <a:lnSpc>
-                <a:spcPct val="90000"/>
-              </a:lnSpc>
-              <a:spcBef>
-                <a:spcPts val="500"/>
-              </a:spcBef>
-              <a:buFont typeface="Arial" panose="020B0604020202020204" pitchFamily="34" charset="0"/>
-              <a:buChar char="•"/>
-              <a:defRPr sz="1800" kern="1200">
-                <a:solidFill>
-                  <a:schemeClr val="tx1"/>
-                </a:solidFill>
-                <a:latin typeface="+mn-lt"/>
-                <a:ea typeface="+mn-ea"/>
-                <a:cs typeface="+mn-cs"/>
-              </a:defRPr>
-            </a:lvl8pPr>
-            <a:lvl9pPr marL="3886200" indent="-228600" algn="l" defTabSz="914400" rtl="0" eaLnBrk="1" latinLnBrk="0" hangingPunct="1">
-              <a:lnSpc>
-                <a:spcPct val="90000"/>
-              </a:lnSpc>
-              <a:spcBef>
-                <a:spcPts val="500"/>
-              </a:spcBef>
-              <a:buFont typeface="Arial" panose="020B0604020202020204" pitchFamily="34" charset="0"/>
-              <a:buChar char="•"/>
-              <a:defRPr sz="1800" kern="1200">
-                <a:solidFill>
-                  <a:schemeClr val="tx1"/>
-                </a:solidFill>
-                <a:latin typeface="+mn-lt"/>
-                <a:ea typeface="+mn-ea"/>
-                <a:cs typeface="+mn-cs"/>
-              </a:defRPr>
-            </a:lvl9pPr>
-          </a:lstStyle>
-          <a:p>
-            <a:r>
-              <a:rPr lang="en-US"/>
-              <a:t>Anshita Varshney</a:t>
-            </a:r>
-            <a:endParaRPr lang="en-US" dirty="0"/>
-          </a:p>
-        </p:txBody>
-      </p:sp>
-      <p:sp>
-        <p:nvSpPr>
-          <p:cNvPr id="9" name="Text Placeholder 4">
-            <a:extLst>
-              <a:ext uri="{FF2B5EF4-FFF2-40B4-BE49-F238E27FC236}">
-                <a16:creationId xmlns:a16="http://schemas.microsoft.com/office/drawing/2014/main" id="{0655E629-45AB-476B-9CD2-DE78F7813632}"/>
-              </a:ext>
-            </a:extLst>
-          </p:cNvPr>
-          <p:cNvSpPr txBox="1">
-            <a:spLocks/>
-          </p:cNvSpPr>
-          <p:nvPr/>
-        </p:nvSpPr>
-        <p:spPr>
-          <a:xfrm>
-            <a:off x="8075675" y="4518792"/>
-            <a:ext cx="3521514" cy="288000"/>
-          </a:xfrm>
-          <a:prstGeom prst="rect">
-            <a:avLst/>
-          </a:prstGeom>
-        </p:spPr>
-        <p:txBody>
-          <a:bodyPr/>
-          <a:lstStyle>
-            <a:lvl1pPr marL="266700" indent="-266700" algn="l" defTabSz="914400" rtl="0" eaLnBrk="1" latinLnBrk="0" hangingPunct="1">
-              <a:lnSpc>
-                <a:spcPct val="90000"/>
-              </a:lnSpc>
-              <a:spcBef>
-                <a:spcPts val="1000"/>
-              </a:spcBef>
-              <a:buFont typeface="Arial" panose="020B0604020202020204" pitchFamily="34" charset="0"/>
-              <a:buChar char="•"/>
-              <a:defRPr sz="1800" kern="1200">
-                <a:solidFill>
-                  <a:schemeClr val="tx1">
-                    <a:lumMod val="75000"/>
-                    <a:lumOff val="25000"/>
-                  </a:schemeClr>
-                </a:solidFill>
-                <a:latin typeface="+mn-lt"/>
-                <a:ea typeface="+mn-ea"/>
-                <a:cs typeface="+mn-cs"/>
-              </a:defRPr>
-            </a:lvl1pPr>
-            <a:lvl2pPr marL="542925" indent="-276225" algn="l" defTabSz="914400" rtl="0" eaLnBrk="1" latinLnBrk="0" hangingPunct="1">
-              <a:lnSpc>
-                <a:spcPct val="90000"/>
-              </a:lnSpc>
-              <a:spcBef>
-                <a:spcPts val="500"/>
-              </a:spcBef>
-              <a:buFont typeface="Arial" panose="020B0604020202020204" pitchFamily="34" charset="0"/>
-              <a:buChar char="•"/>
-              <a:defRPr sz="1600" kern="1200">
-                <a:solidFill>
-                  <a:schemeClr val="tx1">
-                    <a:lumMod val="75000"/>
-                    <a:lumOff val="25000"/>
-                  </a:schemeClr>
-                </a:solidFill>
-                <a:latin typeface="+mn-lt"/>
-                <a:ea typeface="+mn-ea"/>
-                <a:cs typeface="+mn-cs"/>
-              </a:defRPr>
-            </a:lvl2pPr>
-            <a:lvl3pPr marL="809625" indent="-266700" algn="l" defTabSz="914400" rtl="0" eaLnBrk="1" latinLnBrk="0" hangingPunct="1">
-              <a:lnSpc>
-                <a:spcPct val="90000"/>
-              </a:lnSpc>
-              <a:spcBef>
-                <a:spcPts val="500"/>
-              </a:spcBef>
-              <a:buFont typeface="Arial" panose="020B0604020202020204" pitchFamily="34" charset="0"/>
-              <a:buChar char="•"/>
-              <a:defRPr sz="1400" kern="1200">
-                <a:solidFill>
-                  <a:schemeClr val="tx1">
-                    <a:lumMod val="75000"/>
-                    <a:lumOff val="25000"/>
-                  </a:schemeClr>
-                </a:solidFill>
-                <a:latin typeface="+mn-lt"/>
-                <a:ea typeface="+mn-ea"/>
-                <a:cs typeface="+mn-cs"/>
-              </a:defRPr>
-            </a:lvl3pPr>
-            <a:lvl4pPr marL="1076325" indent="-266700" algn="l" defTabSz="914400" rtl="0" eaLnBrk="1" latinLnBrk="0" hangingPunct="1">
-              <a:lnSpc>
-                <a:spcPct val="90000"/>
-              </a:lnSpc>
-              <a:spcBef>
-                <a:spcPts val="500"/>
-              </a:spcBef>
-              <a:buFont typeface="Arial" panose="020B0604020202020204" pitchFamily="34" charset="0"/>
-              <a:buChar char="•"/>
-              <a:defRPr sz="1400" kern="1200">
-                <a:solidFill>
-                  <a:schemeClr val="tx1">
-                    <a:lumMod val="75000"/>
-                    <a:lumOff val="25000"/>
-                  </a:schemeClr>
-                </a:solidFill>
-                <a:latin typeface="+mn-lt"/>
-                <a:ea typeface="+mn-ea"/>
-                <a:cs typeface="+mn-cs"/>
-              </a:defRPr>
-            </a:lvl4pPr>
-            <a:lvl5pPr marL="1343025" indent="-266700" algn="l" defTabSz="914400" rtl="0" eaLnBrk="1" latinLnBrk="0" hangingPunct="1">
-              <a:lnSpc>
-                <a:spcPct val="90000"/>
-              </a:lnSpc>
-              <a:spcBef>
-                <a:spcPts val="500"/>
-              </a:spcBef>
-              <a:buFont typeface="Arial" panose="020B0604020202020204" pitchFamily="34" charset="0"/>
-              <a:buChar char="•"/>
-              <a:defRPr sz="1400" kern="1200">
-                <a:solidFill>
-                  <a:schemeClr val="tx1">
-                    <a:lumMod val="75000"/>
-                    <a:lumOff val="25000"/>
-                  </a:schemeClr>
-                </a:solidFill>
-                <a:latin typeface="+mn-lt"/>
-                <a:ea typeface="+mn-ea"/>
-                <a:cs typeface="+mn-cs"/>
-              </a:defRPr>
-            </a:lvl5pPr>
-            <a:lvl6pPr marL="2514600" indent="-228600" algn="l" defTabSz="914400" rtl="0" eaLnBrk="1" latinLnBrk="0" hangingPunct="1">
-              <a:lnSpc>
-                <a:spcPct val="90000"/>
-              </a:lnSpc>
-              <a:spcBef>
-                <a:spcPts val="500"/>
-              </a:spcBef>
-              <a:buFont typeface="Arial" panose="020B0604020202020204" pitchFamily="34" charset="0"/>
-              <a:buChar char="•"/>
-              <a:defRPr sz="1800" kern="1200">
-                <a:solidFill>
-                  <a:schemeClr val="tx1"/>
-                </a:solidFill>
-                <a:latin typeface="+mn-lt"/>
-                <a:ea typeface="+mn-ea"/>
-                <a:cs typeface="+mn-cs"/>
-              </a:defRPr>
-            </a:lvl6pPr>
-            <a:lvl7pPr marL="2971800" indent="-228600" algn="l" defTabSz="914400" rtl="0" eaLnBrk="1" latinLnBrk="0" hangingPunct="1">
-              <a:lnSpc>
-                <a:spcPct val="90000"/>
-              </a:lnSpc>
-              <a:spcBef>
-                <a:spcPts val="500"/>
-              </a:spcBef>
-              <a:buFont typeface="Arial" panose="020B0604020202020204" pitchFamily="34" charset="0"/>
-              <a:buChar char="•"/>
-              <a:defRPr sz="1800" kern="1200">
-                <a:solidFill>
-                  <a:schemeClr val="tx1"/>
-                </a:solidFill>
-                <a:latin typeface="+mn-lt"/>
-                <a:ea typeface="+mn-ea"/>
-                <a:cs typeface="+mn-cs"/>
-              </a:defRPr>
-            </a:lvl7pPr>
-            <a:lvl8pPr marL="3429000" indent="-228600" algn="l" defTabSz="914400" rtl="0" eaLnBrk="1" latinLnBrk="0" hangingPunct="1">
-              <a:lnSpc>
-                <a:spcPct val="90000"/>
-              </a:lnSpc>
-              <a:spcBef>
-                <a:spcPts val="500"/>
-              </a:spcBef>
-              <a:buFont typeface="Arial" panose="020B0604020202020204" pitchFamily="34" charset="0"/>
-              <a:buChar char="•"/>
-              <a:defRPr sz="1800" kern="1200">
-                <a:solidFill>
-                  <a:schemeClr val="tx1"/>
-                </a:solidFill>
-                <a:latin typeface="+mn-lt"/>
-                <a:ea typeface="+mn-ea"/>
-                <a:cs typeface="+mn-cs"/>
-              </a:defRPr>
-            </a:lvl8pPr>
-            <a:lvl9pPr marL="3886200" indent="-228600" algn="l" defTabSz="914400" rtl="0" eaLnBrk="1" latinLnBrk="0" hangingPunct="1">
-              <a:lnSpc>
-                <a:spcPct val="90000"/>
-              </a:lnSpc>
-              <a:spcBef>
-                <a:spcPts val="500"/>
-              </a:spcBef>
-              <a:buFont typeface="Arial" panose="020B0604020202020204" pitchFamily="34" charset="0"/>
-              <a:buChar char="•"/>
-              <a:defRPr sz="1800" kern="1200">
-                <a:solidFill>
-                  <a:schemeClr val="tx1"/>
-                </a:solidFill>
-                <a:latin typeface="+mn-lt"/>
-                <a:ea typeface="+mn-ea"/>
-                <a:cs typeface="+mn-cs"/>
-              </a:defRPr>
-            </a:lvl9pPr>
-          </a:lstStyle>
-          <a:p>
-            <a:r>
-              <a:rPr lang="en-US"/>
-              <a:t>Chongli Zhao </a:t>
-            </a:r>
-            <a:endParaRPr lang="en-US" dirty="0"/>
-          </a:p>
-        </p:txBody>
-      </p:sp>
-      <p:sp>
-        <p:nvSpPr>
-          <p:cNvPr id="10" name="Text Placeholder 5">
-            <a:extLst>
-              <a:ext uri="{FF2B5EF4-FFF2-40B4-BE49-F238E27FC236}">
-                <a16:creationId xmlns:a16="http://schemas.microsoft.com/office/drawing/2014/main" id="{8E7FAFF9-8CB4-4932-8D1B-CD885637D521}"/>
-              </a:ext>
-            </a:extLst>
-          </p:cNvPr>
-          <p:cNvSpPr txBox="1">
-            <a:spLocks/>
-          </p:cNvSpPr>
-          <p:nvPr/>
-        </p:nvSpPr>
-        <p:spPr>
-          <a:xfrm>
-            <a:off x="8075675" y="4874598"/>
-            <a:ext cx="3521514" cy="288000"/>
-          </a:xfrm>
-          <a:prstGeom prst="rect">
-            <a:avLst/>
-          </a:prstGeom>
-        </p:spPr>
-        <p:txBody>
-          <a:bodyPr/>
-          <a:lstStyle>
-            <a:lvl1pPr marL="266700" indent="-266700" algn="l" defTabSz="914400" rtl="0" eaLnBrk="1" latinLnBrk="0" hangingPunct="1">
-              <a:lnSpc>
-                <a:spcPct val="90000"/>
-              </a:lnSpc>
-              <a:spcBef>
-                <a:spcPts val="1000"/>
-              </a:spcBef>
-              <a:buFont typeface="Arial" panose="020B0604020202020204" pitchFamily="34" charset="0"/>
-              <a:buChar char="•"/>
-              <a:defRPr sz="1800" kern="1200">
-                <a:solidFill>
-                  <a:schemeClr val="tx1">
-                    <a:lumMod val="75000"/>
-                    <a:lumOff val="25000"/>
-                  </a:schemeClr>
-                </a:solidFill>
-                <a:latin typeface="+mn-lt"/>
-                <a:ea typeface="+mn-ea"/>
-                <a:cs typeface="+mn-cs"/>
-              </a:defRPr>
-            </a:lvl1pPr>
-            <a:lvl2pPr marL="542925" indent="-276225" algn="l" defTabSz="914400" rtl="0" eaLnBrk="1" latinLnBrk="0" hangingPunct="1">
-              <a:lnSpc>
-                <a:spcPct val="90000"/>
-              </a:lnSpc>
-              <a:spcBef>
-                <a:spcPts val="500"/>
-              </a:spcBef>
-              <a:buFont typeface="Arial" panose="020B0604020202020204" pitchFamily="34" charset="0"/>
-              <a:buChar char="•"/>
-              <a:defRPr sz="1600" kern="1200">
-                <a:solidFill>
-                  <a:schemeClr val="tx1">
-                    <a:lumMod val="75000"/>
-                    <a:lumOff val="25000"/>
-                  </a:schemeClr>
-                </a:solidFill>
-                <a:latin typeface="+mn-lt"/>
-                <a:ea typeface="+mn-ea"/>
-                <a:cs typeface="+mn-cs"/>
-              </a:defRPr>
-            </a:lvl2pPr>
-            <a:lvl3pPr marL="809625" indent="-266700" algn="l" defTabSz="914400" rtl="0" eaLnBrk="1" latinLnBrk="0" hangingPunct="1">
-              <a:lnSpc>
-                <a:spcPct val="90000"/>
-              </a:lnSpc>
-              <a:spcBef>
-                <a:spcPts val="500"/>
-              </a:spcBef>
-              <a:buFont typeface="Arial" panose="020B0604020202020204" pitchFamily="34" charset="0"/>
-              <a:buChar char="•"/>
-              <a:defRPr sz="1400" kern="1200">
-                <a:solidFill>
-                  <a:schemeClr val="tx1">
-                    <a:lumMod val="75000"/>
-                    <a:lumOff val="25000"/>
-                  </a:schemeClr>
-                </a:solidFill>
-                <a:latin typeface="+mn-lt"/>
-                <a:ea typeface="+mn-ea"/>
-                <a:cs typeface="+mn-cs"/>
-              </a:defRPr>
-            </a:lvl3pPr>
-            <a:lvl4pPr marL="1076325" indent="-266700" algn="l" defTabSz="914400" rtl="0" eaLnBrk="1" latinLnBrk="0" hangingPunct="1">
-              <a:lnSpc>
-                <a:spcPct val="90000"/>
-              </a:lnSpc>
-              <a:spcBef>
-                <a:spcPts val="500"/>
-              </a:spcBef>
-              <a:buFont typeface="Arial" panose="020B0604020202020204" pitchFamily="34" charset="0"/>
-              <a:buChar char="•"/>
-              <a:defRPr sz="1400" kern="1200">
-                <a:solidFill>
-                  <a:schemeClr val="tx1">
-                    <a:lumMod val="75000"/>
-                    <a:lumOff val="25000"/>
-                  </a:schemeClr>
-                </a:solidFill>
-                <a:latin typeface="+mn-lt"/>
-                <a:ea typeface="+mn-ea"/>
-                <a:cs typeface="+mn-cs"/>
-              </a:defRPr>
-            </a:lvl4pPr>
-            <a:lvl5pPr marL="1343025" indent="-266700" algn="l" defTabSz="914400" rtl="0" eaLnBrk="1" latinLnBrk="0" hangingPunct="1">
-              <a:lnSpc>
-                <a:spcPct val="90000"/>
-              </a:lnSpc>
-              <a:spcBef>
-                <a:spcPts val="500"/>
-              </a:spcBef>
-              <a:buFont typeface="Arial" panose="020B0604020202020204" pitchFamily="34" charset="0"/>
-              <a:buChar char="•"/>
-              <a:defRPr sz="1400" kern="1200">
-                <a:solidFill>
-                  <a:schemeClr val="tx1">
-                    <a:lumMod val="75000"/>
-                    <a:lumOff val="25000"/>
-                  </a:schemeClr>
-                </a:solidFill>
-                <a:latin typeface="+mn-lt"/>
-                <a:ea typeface="+mn-ea"/>
-                <a:cs typeface="+mn-cs"/>
-              </a:defRPr>
-            </a:lvl5pPr>
-            <a:lvl6pPr marL="2514600" indent="-228600" algn="l" defTabSz="914400" rtl="0" eaLnBrk="1" latinLnBrk="0" hangingPunct="1">
-              <a:lnSpc>
-                <a:spcPct val="90000"/>
-              </a:lnSpc>
-              <a:spcBef>
-                <a:spcPts val="500"/>
-              </a:spcBef>
-              <a:buFont typeface="Arial" panose="020B0604020202020204" pitchFamily="34" charset="0"/>
-              <a:buChar char="•"/>
-              <a:defRPr sz="1800" kern="1200">
-                <a:solidFill>
-                  <a:schemeClr val="tx1"/>
-                </a:solidFill>
-                <a:latin typeface="+mn-lt"/>
-                <a:ea typeface="+mn-ea"/>
-                <a:cs typeface="+mn-cs"/>
-              </a:defRPr>
-            </a:lvl6pPr>
-            <a:lvl7pPr marL="2971800" indent="-228600" algn="l" defTabSz="914400" rtl="0" eaLnBrk="1" latinLnBrk="0" hangingPunct="1">
-              <a:lnSpc>
-                <a:spcPct val="90000"/>
-              </a:lnSpc>
-              <a:spcBef>
-                <a:spcPts val="500"/>
-              </a:spcBef>
-              <a:buFont typeface="Arial" panose="020B0604020202020204" pitchFamily="34" charset="0"/>
-              <a:buChar char="•"/>
-              <a:defRPr sz="1800" kern="1200">
-                <a:solidFill>
-                  <a:schemeClr val="tx1"/>
-                </a:solidFill>
-                <a:latin typeface="+mn-lt"/>
-                <a:ea typeface="+mn-ea"/>
-                <a:cs typeface="+mn-cs"/>
-              </a:defRPr>
-            </a:lvl7pPr>
-            <a:lvl8pPr marL="3429000" indent="-228600" algn="l" defTabSz="914400" rtl="0" eaLnBrk="1" latinLnBrk="0" hangingPunct="1">
-              <a:lnSpc>
-                <a:spcPct val="90000"/>
-              </a:lnSpc>
-              <a:spcBef>
-                <a:spcPts val="500"/>
-              </a:spcBef>
-              <a:buFont typeface="Arial" panose="020B0604020202020204" pitchFamily="34" charset="0"/>
-              <a:buChar char="•"/>
-              <a:defRPr sz="1800" kern="1200">
-                <a:solidFill>
-                  <a:schemeClr val="tx1"/>
-                </a:solidFill>
-                <a:latin typeface="+mn-lt"/>
-                <a:ea typeface="+mn-ea"/>
-                <a:cs typeface="+mn-cs"/>
-              </a:defRPr>
-            </a:lvl8pPr>
-            <a:lvl9pPr marL="3886200" indent="-228600" algn="l" defTabSz="914400" rtl="0" eaLnBrk="1" latinLnBrk="0" hangingPunct="1">
-              <a:lnSpc>
-                <a:spcPct val="90000"/>
-              </a:lnSpc>
-              <a:spcBef>
-                <a:spcPts val="500"/>
-              </a:spcBef>
-              <a:buFont typeface="Arial" panose="020B0604020202020204" pitchFamily="34" charset="0"/>
-              <a:buChar char="•"/>
-              <a:defRPr sz="1800" kern="1200">
-                <a:solidFill>
-                  <a:schemeClr val="tx1"/>
-                </a:solidFill>
-                <a:latin typeface="+mn-lt"/>
-                <a:ea typeface="+mn-ea"/>
-                <a:cs typeface="+mn-cs"/>
-              </a:defRPr>
-            </a:lvl9pPr>
-          </a:lstStyle>
-          <a:p>
-            <a:r>
-              <a:rPr lang="en-US"/>
-              <a:t>Dhairya Sheth </a:t>
-            </a:r>
-            <a:endParaRPr lang="en-US" dirty="0"/>
-          </a:p>
-        </p:txBody>
-      </p:sp>
-      <p:sp>
-        <p:nvSpPr>
-          <p:cNvPr id="11" name="Text Placeholder 21">
-            <a:extLst>
-              <a:ext uri="{FF2B5EF4-FFF2-40B4-BE49-F238E27FC236}">
-                <a16:creationId xmlns:a16="http://schemas.microsoft.com/office/drawing/2014/main" id="{6F0F8D41-A533-46C3-8D30-C126E92E743F}"/>
-              </a:ext>
-            </a:extLst>
-          </p:cNvPr>
-          <p:cNvSpPr txBox="1">
-            <a:spLocks/>
-          </p:cNvSpPr>
-          <p:nvPr/>
-        </p:nvSpPr>
-        <p:spPr>
-          <a:xfrm>
-            <a:off x="8068508" y="4188929"/>
-            <a:ext cx="3521514" cy="288000"/>
-          </a:xfrm>
-          <a:prstGeom prst="rect">
-            <a:avLst/>
-          </a:prstGeom>
-        </p:spPr>
-        <p:txBody>
-          <a:bodyPr/>
-          <a:lstStyle>
-            <a:lvl1pPr marL="266700" indent="-266700" algn="l" defTabSz="914400" rtl="0" eaLnBrk="1" latinLnBrk="0" hangingPunct="1">
-              <a:lnSpc>
-                <a:spcPct val="90000"/>
-              </a:lnSpc>
-              <a:spcBef>
-                <a:spcPts val="1000"/>
-              </a:spcBef>
-              <a:buFont typeface="Arial" panose="020B0604020202020204" pitchFamily="34" charset="0"/>
-              <a:buChar char="•"/>
-              <a:defRPr sz="1800" kern="1200">
-                <a:solidFill>
-                  <a:schemeClr val="tx1">
-                    <a:lumMod val="75000"/>
-                    <a:lumOff val="25000"/>
-                  </a:schemeClr>
-                </a:solidFill>
-                <a:latin typeface="+mn-lt"/>
-                <a:ea typeface="+mn-ea"/>
-                <a:cs typeface="+mn-cs"/>
-              </a:defRPr>
-            </a:lvl1pPr>
-            <a:lvl2pPr marL="542925" indent="-276225" algn="l" defTabSz="914400" rtl="0" eaLnBrk="1" latinLnBrk="0" hangingPunct="1">
-              <a:lnSpc>
-                <a:spcPct val="90000"/>
-              </a:lnSpc>
-              <a:spcBef>
-                <a:spcPts val="500"/>
-              </a:spcBef>
-              <a:buFont typeface="Arial" panose="020B0604020202020204" pitchFamily="34" charset="0"/>
-              <a:buChar char="•"/>
-              <a:defRPr sz="1600" kern="1200">
-                <a:solidFill>
-                  <a:schemeClr val="tx1">
-                    <a:lumMod val="75000"/>
-                    <a:lumOff val="25000"/>
-                  </a:schemeClr>
-                </a:solidFill>
-                <a:latin typeface="+mn-lt"/>
-                <a:ea typeface="+mn-ea"/>
-                <a:cs typeface="+mn-cs"/>
-              </a:defRPr>
-            </a:lvl2pPr>
-            <a:lvl3pPr marL="809625" indent="-266700" algn="l" defTabSz="914400" rtl="0" eaLnBrk="1" latinLnBrk="0" hangingPunct="1">
-              <a:lnSpc>
-                <a:spcPct val="90000"/>
-              </a:lnSpc>
-              <a:spcBef>
-                <a:spcPts val="500"/>
-              </a:spcBef>
-              <a:buFont typeface="Arial" panose="020B0604020202020204" pitchFamily="34" charset="0"/>
-              <a:buChar char="•"/>
-              <a:defRPr sz="1400" kern="1200">
-                <a:solidFill>
-                  <a:schemeClr val="tx1">
-                    <a:lumMod val="75000"/>
-                    <a:lumOff val="25000"/>
-                  </a:schemeClr>
-                </a:solidFill>
-                <a:latin typeface="+mn-lt"/>
-                <a:ea typeface="+mn-ea"/>
-                <a:cs typeface="+mn-cs"/>
-              </a:defRPr>
-            </a:lvl3pPr>
-            <a:lvl4pPr marL="1076325" indent="-266700" algn="l" defTabSz="914400" rtl="0" eaLnBrk="1" latinLnBrk="0" hangingPunct="1">
-              <a:lnSpc>
-                <a:spcPct val="90000"/>
-              </a:lnSpc>
-              <a:spcBef>
-                <a:spcPts val="500"/>
-              </a:spcBef>
-              <a:buFont typeface="Arial" panose="020B0604020202020204" pitchFamily="34" charset="0"/>
-              <a:buChar char="•"/>
-              <a:defRPr sz="1400" kern="1200">
-                <a:solidFill>
-                  <a:schemeClr val="tx1">
-                    <a:lumMod val="75000"/>
-                    <a:lumOff val="25000"/>
-                  </a:schemeClr>
-                </a:solidFill>
-                <a:latin typeface="+mn-lt"/>
-                <a:ea typeface="+mn-ea"/>
-                <a:cs typeface="+mn-cs"/>
-              </a:defRPr>
-            </a:lvl4pPr>
-            <a:lvl5pPr marL="1343025" indent="-266700" algn="l" defTabSz="914400" rtl="0" eaLnBrk="1" latinLnBrk="0" hangingPunct="1">
-              <a:lnSpc>
-                <a:spcPct val="90000"/>
-              </a:lnSpc>
-              <a:spcBef>
-                <a:spcPts val="500"/>
-              </a:spcBef>
-              <a:buFont typeface="Arial" panose="020B0604020202020204" pitchFamily="34" charset="0"/>
-              <a:buChar char="•"/>
-              <a:defRPr sz="1400" kern="1200">
-                <a:solidFill>
-                  <a:schemeClr val="tx1">
-                    <a:lumMod val="75000"/>
-                    <a:lumOff val="25000"/>
-                  </a:schemeClr>
-                </a:solidFill>
-                <a:latin typeface="+mn-lt"/>
-                <a:ea typeface="+mn-ea"/>
-                <a:cs typeface="+mn-cs"/>
-              </a:defRPr>
-            </a:lvl5pPr>
-            <a:lvl6pPr marL="2514600" indent="-228600" algn="l" defTabSz="914400" rtl="0" eaLnBrk="1" latinLnBrk="0" hangingPunct="1">
-              <a:lnSpc>
-                <a:spcPct val="90000"/>
-              </a:lnSpc>
-              <a:spcBef>
-                <a:spcPts val="500"/>
-              </a:spcBef>
-              <a:buFont typeface="Arial" panose="020B0604020202020204" pitchFamily="34" charset="0"/>
-              <a:buChar char="•"/>
-              <a:defRPr sz="1800" kern="1200">
-                <a:solidFill>
-                  <a:schemeClr val="tx1"/>
-                </a:solidFill>
-                <a:latin typeface="+mn-lt"/>
-                <a:ea typeface="+mn-ea"/>
-                <a:cs typeface="+mn-cs"/>
-              </a:defRPr>
-            </a:lvl6pPr>
-            <a:lvl7pPr marL="2971800" indent="-228600" algn="l" defTabSz="914400" rtl="0" eaLnBrk="1" latinLnBrk="0" hangingPunct="1">
-              <a:lnSpc>
-                <a:spcPct val="90000"/>
-              </a:lnSpc>
-              <a:spcBef>
-                <a:spcPts val="500"/>
-              </a:spcBef>
-              <a:buFont typeface="Arial" panose="020B0604020202020204" pitchFamily="34" charset="0"/>
-              <a:buChar char="•"/>
-              <a:defRPr sz="1800" kern="1200">
-                <a:solidFill>
-                  <a:schemeClr val="tx1"/>
-                </a:solidFill>
-                <a:latin typeface="+mn-lt"/>
-                <a:ea typeface="+mn-ea"/>
-                <a:cs typeface="+mn-cs"/>
-              </a:defRPr>
-            </a:lvl7pPr>
-            <a:lvl8pPr marL="3429000" indent="-228600" algn="l" defTabSz="914400" rtl="0" eaLnBrk="1" latinLnBrk="0" hangingPunct="1">
-              <a:lnSpc>
-                <a:spcPct val="90000"/>
-              </a:lnSpc>
-              <a:spcBef>
-                <a:spcPts val="500"/>
-              </a:spcBef>
-              <a:buFont typeface="Arial" panose="020B0604020202020204" pitchFamily="34" charset="0"/>
-              <a:buChar char="•"/>
-              <a:defRPr sz="1800" kern="1200">
-                <a:solidFill>
-                  <a:schemeClr val="tx1"/>
-                </a:solidFill>
-                <a:latin typeface="+mn-lt"/>
-                <a:ea typeface="+mn-ea"/>
-                <a:cs typeface="+mn-cs"/>
-              </a:defRPr>
-            </a:lvl8pPr>
-            <a:lvl9pPr marL="3886200" indent="-228600" algn="l" defTabSz="914400" rtl="0" eaLnBrk="1" latinLnBrk="0" hangingPunct="1">
-              <a:lnSpc>
-                <a:spcPct val="90000"/>
-              </a:lnSpc>
-              <a:spcBef>
-                <a:spcPts val="500"/>
-              </a:spcBef>
-              <a:buFont typeface="Arial" panose="020B0604020202020204" pitchFamily="34" charset="0"/>
-              <a:buChar char="•"/>
-              <a:defRPr sz="1800" kern="1200">
-                <a:solidFill>
-                  <a:schemeClr val="tx1"/>
-                </a:solidFill>
-                <a:latin typeface="+mn-lt"/>
-                <a:ea typeface="+mn-ea"/>
-                <a:cs typeface="+mn-cs"/>
-              </a:defRPr>
-            </a:lvl9pPr>
-          </a:lstStyle>
-          <a:p>
-            <a:r>
-              <a:rPr lang="en-US"/>
-              <a:t>Bhavnil Patel </a:t>
-            </a:r>
-            <a:endParaRPr lang="en-US" dirty="0"/>
-          </a:p>
-        </p:txBody>
-      </p:sp>
-      <p:sp>
-        <p:nvSpPr>
-          <p:cNvPr id="12" name="Text Placeholder 5">
-            <a:extLst>
-              <a:ext uri="{FF2B5EF4-FFF2-40B4-BE49-F238E27FC236}">
-                <a16:creationId xmlns:a16="http://schemas.microsoft.com/office/drawing/2014/main" id="{06C2BFBC-11D1-4777-BFE3-0AEA86F1FEE1}"/>
-              </a:ext>
-            </a:extLst>
-          </p:cNvPr>
-          <p:cNvSpPr txBox="1">
-            <a:spLocks/>
-          </p:cNvSpPr>
-          <p:nvPr/>
-        </p:nvSpPr>
-        <p:spPr>
-          <a:xfrm>
-            <a:off x="8068508" y="5192474"/>
-            <a:ext cx="3521514" cy="288000"/>
-          </a:xfrm>
-          <a:prstGeom prst="rect">
-            <a:avLst/>
-          </a:prstGeom>
-        </p:spPr>
-        <p:txBody>
-          <a:bodyPr vert="horz" lIns="0" tIns="0" rIns="0" bIns="0" rtlCol="0">
-            <a:noAutofit/>
-          </a:bodyPr>
-          <a:lstStyle>
-            <a:lvl1pPr marL="0" indent="0" algn="l" defTabSz="914400" rtl="0" eaLnBrk="1" latinLnBrk="0" hangingPunct="1">
-              <a:lnSpc>
-                <a:spcPct val="90000"/>
-              </a:lnSpc>
-              <a:spcBef>
-                <a:spcPts val="1000"/>
-              </a:spcBef>
-              <a:buFont typeface="Arial" panose="020B0604020202020204" pitchFamily="34" charset="0"/>
-              <a:buNone/>
-              <a:defRPr sz="1800" kern="1200">
-                <a:solidFill>
-                  <a:schemeClr val="bg1">
-                    <a:lumMod val="95000"/>
-                  </a:schemeClr>
-                </a:solidFill>
-                <a:latin typeface="+mn-lt"/>
-                <a:ea typeface="+mn-ea"/>
-                <a:cs typeface="+mn-cs"/>
-              </a:defRPr>
-            </a:lvl1pPr>
-            <a:lvl2pPr marL="266700" indent="0" algn="l" defTabSz="914400" rtl="0" eaLnBrk="1" latinLnBrk="0" hangingPunct="1">
-              <a:lnSpc>
-                <a:spcPct val="90000"/>
-              </a:lnSpc>
-              <a:spcBef>
-                <a:spcPts val="500"/>
-              </a:spcBef>
-              <a:buFont typeface="Arial" panose="020B0604020202020204" pitchFamily="34" charset="0"/>
-              <a:buNone/>
-              <a:defRPr sz="1600" kern="1200">
-                <a:solidFill>
-                  <a:schemeClr val="tx1">
-                    <a:lumMod val="75000"/>
-                    <a:lumOff val="25000"/>
-                  </a:schemeClr>
-                </a:solidFill>
-                <a:latin typeface="+mn-lt"/>
-                <a:ea typeface="+mn-ea"/>
-                <a:cs typeface="+mn-cs"/>
-              </a:defRPr>
-            </a:lvl2pPr>
-            <a:lvl3pPr marL="542925" indent="0" algn="l" defTabSz="914400" rtl="0" eaLnBrk="1" latinLnBrk="0" hangingPunct="1">
-              <a:lnSpc>
-                <a:spcPct val="90000"/>
-              </a:lnSpc>
-              <a:spcBef>
-                <a:spcPts val="500"/>
-              </a:spcBef>
-              <a:buFont typeface="Arial" panose="020B0604020202020204" pitchFamily="34" charset="0"/>
-              <a:buNone/>
-              <a:defRPr sz="1400" kern="1200">
-                <a:solidFill>
-                  <a:schemeClr val="tx1">
-                    <a:lumMod val="75000"/>
-                    <a:lumOff val="25000"/>
-                  </a:schemeClr>
-                </a:solidFill>
-                <a:latin typeface="+mn-lt"/>
-                <a:ea typeface="+mn-ea"/>
-                <a:cs typeface="+mn-cs"/>
-              </a:defRPr>
-            </a:lvl3pPr>
-            <a:lvl4pPr marL="809625" indent="0" algn="l" defTabSz="914400" rtl="0" eaLnBrk="1" latinLnBrk="0" hangingPunct="1">
-              <a:lnSpc>
-                <a:spcPct val="90000"/>
-              </a:lnSpc>
-              <a:spcBef>
-                <a:spcPts val="500"/>
-              </a:spcBef>
-              <a:buFont typeface="Arial" panose="020B0604020202020204" pitchFamily="34" charset="0"/>
-              <a:buNone/>
-              <a:defRPr sz="1400" kern="1200">
-                <a:solidFill>
-                  <a:schemeClr val="tx1">
-                    <a:lumMod val="75000"/>
-                    <a:lumOff val="25000"/>
-                  </a:schemeClr>
-                </a:solidFill>
-                <a:latin typeface="+mn-lt"/>
-                <a:ea typeface="+mn-ea"/>
-                <a:cs typeface="+mn-cs"/>
-              </a:defRPr>
-            </a:lvl4pPr>
-            <a:lvl5pPr marL="1076325" indent="0" algn="l" defTabSz="914400" rtl="0" eaLnBrk="1" latinLnBrk="0" hangingPunct="1">
-              <a:lnSpc>
-                <a:spcPct val="90000"/>
-              </a:lnSpc>
-              <a:spcBef>
-                <a:spcPts val="500"/>
-              </a:spcBef>
-              <a:buFont typeface="Arial" panose="020B0604020202020204" pitchFamily="34" charset="0"/>
-              <a:buNone/>
-              <a:defRPr sz="1400" kern="1200">
-                <a:solidFill>
-                  <a:schemeClr val="tx1">
-                    <a:lumMod val="75000"/>
-                    <a:lumOff val="25000"/>
-                  </a:schemeClr>
-                </a:solidFill>
-                <a:latin typeface="+mn-lt"/>
-                <a:ea typeface="+mn-ea"/>
-                <a:cs typeface="+mn-cs"/>
-              </a:defRPr>
-            </a:lvl5pPr>
-            <a:lvl6pPr marL="2514600" indent="-228600" algn="l" defTabSz="914400" rtl="0" eaLnBrk="1" latinLnBrk="0" hangingPunct="1">
-              <a:lnSpc>
-                <a:spcPct val="90000"/>
-              </a:lnSpc>
-              <a:spcBef>
-                <a:spcPts val="500"/>
-              </a:spcBef>
-              <a:buFont typeface="Arial" panose="020B0604020202020204" pitchFamily="34" charset="0"/>
-              <a:buChar char="•"/>
-              <a:defRPr sz="1800" kern="1200">
-                <a:solidFill>
-                  <a:schemeClr val="tx1"/>
-                </a:solidFill>
-                <a:latin typeface="+mn-lt"/>
-                <a:ea typeface="+mn-ea"/>
-                <a:cs typeface="+mn-cs"/>
-              </a:defRPr>
-            </a:lvl6pPr>
-            <a:lvl7pPr marL="2971800" indent="-228600" algn="l" defTabSz="914400" rtl="0" eaLnBrk="1" latinLnBrk="0" hangingPunct="1">
-              <a:lnSpc>
-                <a:spcPct val="90000"/>
-              </a:lnSpc>
-              <a:spcBef>
-                <a:spcPts val="500"/>
-              </a:spcBef>
-              <a:buFont typeface="Arial" panose="020B0604020202020204" pitchFamily="34" charset="0"/>
-              <a:buChar char="•"/>
-              <a:defRPr sz="1800" kern="1200">
-                <a:solidFill>
-                  <a:schemeClr val="tx1"/>
-                </a:solidFill>
-                <a:latin typeface="+mn-lt"/>
-                <a:ea typeface="+mn-ea"/>
-                <a:cs typeface="+mn-cs"/>
-              </a:defRPr>
-            </a:lvl7pPr>
-            <a:lvl8pPr marL="3429000" indent="-228600" algn="l" defTabSz="914400" rtl="0" eaLnBrk="1" latinLnBrk="0" hangingPunct="1">
-              <a:lnSpc>
-                <a:spcPct val="90000"/>
-              </a:lnSpc>
-              <a:spcBef>
-                <a:spcPts val="500"/>
-              </a:spcBef>
-              <a:buFont typeface="Arial" panose="020B0604020202020204" pitchFamily="34" charset="0"/>
-              <a:buChar char="•"/>
-              <a:defRPr sz="1800" kern="1200">
-                <a:solidFill>
-                  <a:schemeClr val="tx1"/>
-                </a:solidFill>
-                <a:latin typeface="+mn-lt"/>
-                <a:ea typeface="+mn-ea"/>
-                <a:cs typeface="+mn-cs"/>
-              </a:defRPr>
-            </a:lvl8pPr>
-            <a:lvl9pPr marL="3886200" indent="-228600" algn="l" defTabSz="914400" rtl="0" eaLnBrk="1" latinLnBrk="0" hangingPunct="1">
-              <a:lnSpc>
-                <a:spcPct val="90000"/>
-              </a:lnSpc>
-              <a:spcBef>
-                <a:spcPts val="500"/>
-              </a:spcBef>
-              <a:buFont typeface="Arial" panose="020B0604020202020204" pitchFamily="34" charset="0"/>
-              <a:buChar char="•"/>
-              <a:defRPr sz="1800" kern="1200">
-                <a:solidFill>
-                  <a:schemeClr val="tx1"/>
-                </a:solidFill>
-                <a:latin typeface="+mn-lt"/>
-                <a:ea typeface="+mn-ea"/>
-                <a:cs typeface="+mn-cs"/>
-              </a:defRPr>
-            </a:lvl9pPr>
-          </a:lstStyle>
-          <a:p>
-            <a:r>
-              <a:rPr lang="en-US" dirty="0"/>
-              <a:t>Jyoti </a:t>
-            </a:r>
-            <a:r>
-              <a:rPr lang="en-US" dirty="0" err="1"/>
-              <a:t>Lnu</a:t>
-            </a:r>
-            <a:r>
-              <a:rPr lang="en-US" dirty="0"/>
-              <a:t> </a:t>
-            </a:r>
-          </a:p>
-        </p:txBody>
-      </p:sp>
-      <p:sp>
-        <p:nvSpPr>
-          <p:cNvPr id="13" name="Text Placeholder 5">
-            <a:extLst>
-              <a:ext uri="{FF2B5EF4-FFF2-40B4-BE49-F238E27FC236}">
-                <a16:creationId xmlns:a16="http://schemas.microsoft.com/office/drawing/2014/main" id="{877CAC3F-6F2E-4740-8240-89C03AAEC322}"/>
-              </a:ext>
-            </a:extLst>
-          </p:cNvPr>
-          <p:cNvSpPr txBox="1">
-            <a:spLocks/>
-          </p:cNvSpPr>
-          <p:nvPr/>
-        </p:nvSpPr>
-        <p:spPr>
-          <a:xfrm>
-            <a:off x="8075675" y="5552359"/>
-            <a:ext cx="3521514" cy="288000"/>
-          </a:xfrm>
-          <a:prstGeom prst="rect">
-            <a:avLst/>
-          </a:prstGeom>
-        </p:spPr>
-        <p:txBody>
-          <a:bodyPr vert="horz" lIns="0" tIns="0" rIns="0" bIns="0" rtlCol="0">
-            <a:noAutofit/>
-          </a:bodyPr>
-          <a:lstStyle>
-            <a:lvl1pPr marL="0" indent="0" algn="l" defTabSz="914400" rtl="0" eaLnBrk="1" latinLnBrk="0" hangingPunct="1">
-              <a:lnSpc>
-                <a:spcPct val="90000"/>
-              </a:lnSpc>
-              <a:spcBef>
-                <a:spcPts val="1000"/>
-              </a:spcBef>
-              <a:buFont typeface="Arial" panose="020B0604020202020204" pitchFamily="34" charset="0"/>
-              <a:buNone/>
-              <a:defRPr sz="1800" kern="1200">
-                <a:solidFill>
-                  <a:schemeClr val="bg1">
-                    <a:lumMod val="95000"/>
-                  </a:schemeClr>
-                </a:solidFill>
-                <a:latin typeface="+mn-lt"/>
-                <a:ea typeface="+mn-ea"/>
-                <a:cs typeface="+mn-cs"/>
-              </a:defRPr>
-            </a:lvl1pPr>
-            <a:lvl2pPr marL="266700" indent="0" algn="l" defTabSz="914400" rtl="0" eaLnBrk="1" latinLnBrk="0" hangingPunct="1">
-              <a:lnSpc>
-                <a:spcPct val="90000"/>
-              </a:lnSpc>
-              <a:spcBef>
-                <a:spcPts val="500"/>
-              </a:spcBef>
-              <a:buFont typeface="Arial" panose="020B0604020202020204" pitchFamily="34" charset="0"/>
-              <a:buNone/>
-              <a:defRPr sz="1600" kern="1200">
-                <a:solidFill>
-                  <a:schemeClr val="tx1">
-                    <a:lumMod val="75000"/>
-                    <a:lumOff val="25000"/>
-                  </a:schemeClr>
-                </a:solidFill>
-                <a:latin typeface="+mn-lt"/>
-                <a:ea typeface="+mn-ea"/>
-                <a:cs typeface="+mn-cs"/>
-              </a:defRPr>
-            </a:lvl2pPr>
-            <a:lvl3pPr marL="542925" indent="0" algn="l" defTabSz="914400" rtl="0" eaLnBrk="1" latinLnBrk="0" hangingPunct="1">
-              <a:lnSpc>
-                <a:spcPct val="90000"/>
-              </a:lnSpc>
-              <a:spcBef>
-                <a:spcPts val="500"/>
-              </a:spcBef>
-              <a:buFont typeface="Arial" panose="020B0604020202020204" pitchFamily="34" charset="0"/>
-              <a:buNone/>
-              <a:defRPr sz="1400" kern="1200">
-                <a:solidFill>
-                  <a:schemeClr val="tx1">
-                    <a:lumMod val="75000"/>
-                    <a:lumOff val="25000"/>
-                  </a:schemeClr>
-                </a:solidFill>
-                <a:latin typeface="+mn-lt"/>
-                <a:ea typeface="+mn-ea"/>
-                <a:cs typeface="+mn-cs"/>
-              </a:defRPr>
-            </a:lvl3pPr>
-            <a:lvl4pPr marL="809625" indent="0" algn="l" defTabSz="914400" rtl="0" eaLnBrk="1" latinLnBrk="0" hangingPunct="1">
-              <a:lnSpc>
-                <a:spcPct val="90000"/>
-              </a:lnSpc>
-              <a:spcBef>
-                <a:spcPts val="500"/>
-              </a:spcBef>
-              <a:buFont typeface="Arial" panose="020B0604020202020204" pitchFamily="34" charset="0"/>
-              <a:buNone/>
-              <a:defRPr sz="1400" kern="1200">
-                <a:solidFill>
-                  <a:schemeClr val="tx1">
-                    <a:lumMod val="75000"/>
-                    <a:lumOff val="25000"/>
-                  </a:schemeClr>
-                </a:solidFill>
-                <a:latin typeface="+mn-lt"/>
-                <a:ea typeface="+mn-ea"/>
-                <a:cs typeface="+mn-cs"/>
-              </a:defRPr>
-            </a:lvl4pPr>
-            <a:lvl5pPr marL="1076325" indent="0" algn="l" defTabSz="914400" rtl="0" eaLnBrk="1" latinLnBrk="0" hangingPunct="1">
-              <a:lnSpc>
-                <a:spcPct val="90000"/>
-              </a:lnSpc>
-              <a:spcBef>
-                <a:spcPts val="500"/>
-              </a:spcBef>
-              <a:buFont typeface="Arial" panose="020B0604020202020204" pitchFamily="34" charset="0"/>
-              <a:buNone/>
-              <a:defRPr sz="1400" kern="1200">
-                <a:solidFill>
-                  <a:schemeClr val="tx1">
-                    <a:lumMod val="75000"/>
-                    <a:lumOff val="25000"/>
-                  </a:schemeClr>
-                </a:solidFill>
-                <a:latin typeface="+mn-lt"/>
-                <a:ea typeface="+mn-ea"/>
-                <a:cs typeface="+mn-cs"/>
-              </a:defRPr>
-            </a:lvl5pPr>
-            <a:lvl6pPr marL="2514600" indent="-228600" algn="l" defTabSz="914400" rtl="0" eaLnBrk="1" latinLnBrk="0" hangingPunct="1">
-              <a:lnSpc>
-                <a:spcPct val="90000"/>
-              </a:lnSpc>
-              <a:spcBef>
-                <a:spcPts val="500"/>
-              </a:spcBef>
-              <a:buFont typeface="Arial" panose="020B0604020202020204" pitchFamily="34" charset="0"/>
-              <a:buChar char="•"/>
-              <a:defRPr sz="1800" kern="1200">
-                <a:solidFill>
-                  <a:schemeClr val="tx1"/>
-                </a:solidFill>
-                <a:latin typeface="+mn-lt"/>
-                <a:ea typeface="+mn-ea"/>
-                <a:cs typeface="+mn-cs"/>
-              </a:defRPr>
-            </a:lvl6pPr>
-            <a:lvl7pPr marL="2971800" indent="-228600" algn="l" defTabSz="914400" rtl="0" eaLnBrk="1" latinLnBrk="0" hangingPunct="1">
-              <a:lnSpc>
-                <a:spcPct val="90000"/>
-              </a:lnSpc>
-              <a:spcBef>
-                <a:spcPts val="500"/>
-              </a:spcBef>
-              <a:buFont typeface="Arial" panose="020B0604020202020204" pitchFamily="34" charset="0"/>
-              <a:buChar char="•"/>
-              <a:defRPr sz="1800" kern="1200">
-                <a:solidFill>
-                  <a:schemeClr val="tx1"/>
-                </a:solidFill>
-                <a:latin typeface="+mn-lt"/>
-                <a:ea typeface="+mn-ea"/>
-                <a:cs typeface="+mn-cs"/>
-              </a:defRPr>
-            </a:lvl7pPr>
-            <a:lvl8pPr marL="3429000" indent="-228600" algn="l" defTabSz="914400" rtl="0" eaLnBrk="1" latinLnBrk="0" hangingPunct="1">
-              <a:lnSpc>
-                <a:spcPct val="90000"/>
-              </a:lnSpc>
-              <a:spcBef>
-                <a:spcPts val="500"/>
-              </a:spcBef>
-              <a:buFont typeface="Arial" panose="020B0604020202020204" pitchFamily="34" charset="0"/>
-              <a:buChar char="•"/>
-              <a:defRPr sz="1800" kern="1200">
-                <a:solidFill>
-                  <a:schemeClr val="tx1"/>
-                </a:solidFill>
-                <a:latin typeface="+mn-lt"/>
-                <a:ea typeface="+mn-ea"/>
-                <a:cs typeface="+mn-cs"/>
-              </a:defRPr>
-            </a:lvl8pPr>
-            <a:lvl9pPr marL="3886200" indent="-228600" algn="l" defTabSz="914400" rtl="0" eaLnBrk="1" latinLnBrk="0" hangingPunct="1">
-              <a:lnSpc>
-                <a:spcPct val="90000"/>
-              </a:lnSpc>
-              <a:spcBef>
-                <a:spcPts val="500"/>
-              </a:spcBef>
-              <a:buFont typeface="Arial" panose="020B0604020202020204" pitchFamily="34" charset="0"/>
-              <a:buChar char="•"/>
-              <a:defRPr sz="1800" kern="1200">
-                <a:solidFill>
-                  <a:schemeClr val="tx1"/>
-                </a:solidFill>
-                <a:latin typeface="+mn-lt"/>
-                <a:ea typeface="+mn-ea"/>
-                <a:cs typeface="+mn-cs"/>
-              </a:defRPr>
-            </a:lvl9pPr>
-          </a:lstStyle>
-          <a:p>
-            <a:r>
-              <a:rPr lang="en-US" dirty="0" err="1"/>
-              <a:t>Ruofan</a:t>
-            </a:r>
-            <a:r>
-              <a:rPr lang="en-US" dirty="0"/>
-              <a:t> Wu </a:t>
-            </a:r>
-          </a:p>
-        </p:txBody>
-      </p:sp>
-      <p:sp>
-        <p:nvSpPr>
           <p:cNvPr id="14" name="Text Placeholder 3">
             <a:extLst>
               <a:ext uri="{FF2B5EF4-FFF2-40B4-BE49-F238E27FC236}">
@@ -27298,7 +26008,7 @@
           <a:p>
             <a:r>
               <a:rPr lang="en-US" sz="3000" dirty="0"/>
-              <a:t>Model II – Bayesian Linear Regression using PyMC3</a:t>
+              <a:t>Model II – Data Analysis - Heatmap</a:t>
             </a:r>
           </a:p>
         </p:txBody>
@@ -27375,91 +26085,6 @@
       </p:sp>
       <p:sp>
         <p:nvSpPr>
-          <p:cNvPr id="3" name="Text Placeholder 2">
-            <a:extLst>
-              <a:ext uri="{FF2B5EF4-FFF2-40B4-BE49-F238E27FC236}">
-                <a16:creationId xmlns:a16="http://schemas.microsoft.com/office/drawing/2014/main" id="{97C06D93-65F2-4552-88CF-83318CBE2CFC}"/>
-              </a:ext>
-            </a:extLst>
-          </p:cNvPr>
-          <p:cNvSpPr>
-            <a:spLocks noGrp="1"/>
-          </p:cNvSpPr>
-          <p:nvPr>
-            <p:ph sz="half" idx="1"/>
-          </p:nvPr>
-        </p:nvSpPr>
-        <p:spPr>
-          <a:xfrm>
-            <a:off x="432000" y="1251284"/>
-            <a:ext cx="5460114" cy="3684700"/>
-          </a:xfrm>
-          <a:prstGeom prst="rect">
-            <a:avLst/>
-          </a:prstGeom>
-        </p:spPr>
-        <p:txBody>
-          <a:bodyPr>
-            <a:normAutofit lnSpcReduction="10000"/>
-          </a:bodyPr>
-          <a:lstStyle/>
-          <a:p>
-            <a:r>
-              <a:rPr lang="en-US" dirty="0"/>
-              <a:t>We did Regression modelling in the Bayesian framework and carried out inference using the PyMC3 MCMC library.</a:t>
-            </a:r>
-          </a:p>
-          <a:p>
-            <a:r>
-              <a:rPr lang="en-US" dirty="0"/>
-              <a:t>We do this primarily because:</a:t>
-            </a:r>
-          </a:p>
-          <a:p>
-            <a:pPr lvl="1"/>
-            <a:r>
-              <a:rPr lang="en-US" dirty="0"/>
-              <a:t>We have a limited dataset</a:t>
-            </a:r>
-          </a:p>
-          <a:p>
-            <a:pPr lvl="1"/>
-            <a:r>
-              <a:rPr lang="en-US" dirty="0"/>
-              <a:t>Some facts may be more likely than others, but that information may not be contained in the data we are using for modeling.</a:t>
-            </a:r>
-          </a:p>
-          <a:p>
-            <a:pPr lvl="1"/>
-            <a:r>
-              <a:rPr lang="en-US" dirty="0"/>
-              <a:t>We are interested in knowing how likely certain facts are</a:t>
-            </a:r>
-          </a:p>
-          <a:p>
-            <a:r>
-              <a:rPr lang="en-US" dirty="0"/>
-              <a:t>Critical Advantages of Bayesian estimation:</a:t>
-            </a:r>
-          </a:p>
-          <a:p>
-            <a:pPr lvl="1"/>
-            <a:r>
-              <a:rPr lang="en-US" dirty="0"/>
-              <a:t>Priors: We can quantify any prior knowledge we might have by placing priors on the parameters.</a:t>
-            </a:r>
-          </a:p>
-          <a:p>
-            <a:pPr lvl="1"/>
-            <a:r>
-              <a:rPr lang="en-US" dirty="0"/>
-              <a:t>Quantifying uncertainty: We do not get a single estimate of β but instead a complete posterior distribution about how likely different values of β are.</a:t>
-            </a:r>
-          </a:p>
-        </p:txBody>
-      </p:sp>
-      <p:sp>
-        <p:nvSpPr>
           <p:cNvPr id="9" name="Title 1">
             <a:extLst>
               <a:ext uri="{FF2B5EF4-FFF2-40B4-BE49-F238E27FC236}">
@@ -27535,7 +26160,7 @@
         </p:blipFill>
         <p:spPr>
           <a:xfrm>
-            <a:off x="6617152" y="2418347"/>
+            <a:off x="3551104" y="1344612"/>
             <a:ext cx="4805045" cy="4168775"/>
           </a:xfrm>
           <a:prstGeom prst="rect">
@@ -30701,7 +29326,7 @@
         </p:blipFill>
         <p:spPr>
           <a:xfrm>
-            <a:off x="7378413" y="3705363"/>
+            <a:off x="7378413" y="3673098"/>
             <a:ext cx="3261643" cy="2286198"/>
           </a:xfrm>
           <a:prstGeom prst="rect">
@@ -31773,177 +30398,6 @@
             <a:r>
               <a:rPr lang="en-US" sz="1600" dirty="0"/>
               <a:t>Age Group: 36 - 45</a:t>
-            </a:r>
-          </a:p>
-        </p:txBody>
-      </p:sp>
-      <p:sp>
-        <p:nvSpPr>
-          <p:cNvPr id="18" name="Title 1">
-            <a:extLst>
-              <a:ext uri="{FF2B5EF4-FFF2-40B4-BE49-F238E27FC236}">
-                <a16:creationId xmlns:a16="http://schemas.microsoft.com/office/drawing/2014/main" id="{4A8E9E43-213C-4666-92D7-E191090C4F73}"/>
-              </a:ext>
-            </a:extLst>
-          </p:cNvPr>
-          <p:cNvSpPr txBox="1">
-            <a:spLocks/>
-          </p:cNvSpPr>
-          <p:nvPr/>
-        </p:nvSpPr>
-        <p:spPr>
-          <a:xfrm>
-            <a:off x="1033625" y="6149759"/>
-            <a:ext cx="1855876" cy="351641"/>
-          </a:xfrm>
-          <a:prstGeom prst="rect">
-            <a:avLst/>
-          </a:prstGeom>
-        </p:spPr>
-        <p:txBody>
-          <a:bodyPr vert="horz" lIns="0" tIns="0" rIns="0" bIns="0" rtlCol="0" anchor="ctr">
-            <a:noAutofit/>
-          </a:bodyPr>
-          <a:lstStyle>
-            <a:lvl1pPr algn="l" defTabSz="914400" rtl="0" eaLnBrk="1" latinLnBrk="0" hangingPunct="1">
-              <a:lnSpc>
-                <a:spcPct val="90000"/>
-              </a:lnSpc>
-              <a:spcBef>
-                <a:spcPct val="0"/>
-              </a:spcBef>
-              <a:buNone/>
-              <a:defRPr sz="3200" kern="1200">
-                <a:solidFill>
-                  <a:schemeClr val="tx1">
-                    <a:lumMod val="75000"/>
-                    <a:lumOff val="25000"/>
-                  </a:schemeClr>
-                </a:solidFill>
-                <a:latin typeface="+mj-lt"/>
-                <a:ea typeface="+mj-ea"/>
-                <a:cs typeface="+mj-cs"/>
-              </a:defRPr>
-            </a:lvl1pPr>
-          </a:lstStyle>
-          <a:p>
-            <a:r>
-              <a:rPr lang="en-US" sz="1600" dirty="0"/>
-              <a:t>Age Group: 46 - 55</a:t>
-            </a:r>
-          </a:p>
-        </p:txBody>
-      </p:sp>
-      <p:sp>
-        <p:nvSpPr>
-          <p:cNvPr id="21" name="Title 1">
-            <a:extLst>
-              <a:ext uri="{FF2B5EF4-FFF2-40B4-BE49-F238E27FC236}">
-                <a16:creationId xmlns:a16="http://schemas.microsoft.com/office/drawing/2014/main" id="{FAA2F440-C880-40A7-B6B1-BBD89165FA71}"/>
-              </a:ext>
-            </a:extLst>
-          </p:cNvPr>
-          <p:cNvSpPr txBox="1">
-            <a:spLocks/>
-          </p:cNvSpPr>
-          <p:nvPr/>
-        </p:nvSpPr>
-        <p:spPr>
-          <a:xfrm>
-            <a:off x="4542420" y="6149758"/>
-            <a:ext cx="1855876" cy="351641"/>
-          </a:xfrm>
-          <a:prstGeom prst="rect">
-            <a:avLst/>
-          </a:prstGeom>
-        </p:spPr>
-        <p:txBody>
-          <a:bodyPr vert="horz" lIns="0" tIns="0" rIns="0" bIns="0" rtlCol="0" anchor="ctr">
-            <a:noAutofit/>
-          </a:bodyPr>
-          <a:lstStyle>
-            <a:lvl1pPr algn="l" defTabSz="914400" rtl="0" eaLnBrk="1" latinLnBrk="0" hangingPunct="1">
-              <a:lnSpc>
-                <a:spcPct val="90000"/>
-              </a:lnSpc>
-              <a:spcBef>
-                <a:spcPct val="0"/>
-              </a:spcBef>
-              <a:buNone/>
-              <a:defRPr sz="3200" kern="1200">
-                <a:solidFill>
-                  <a:schemeClr val="tx1">
-                    <a:lumMod val="75000"/>
-                    <a:lumOff val="25000"/>
-                  </a:schemeClr>
-                </a:solidFill>
-                <a:latin typeface="+mj-lt"/>
-                <a:ea typeface="+mj-ea"/>
-                <a:cs typeface="+mj-cs"/>
-              </a:defRPr>
-            </a:lvl1pPr>
-          </a:lstStyle>
-          <a:p>
-            <a:r>
-              <a:rPr lang="en-US" sz="1600" dirty="0"/>
-              <a:t>Age Group: 56 - 65</a:t>
-            </a:r>
-          </a:p>
-        </p:txBody>
-      </p:sp>
-      <p:sp>
-        <p:nvSpPr>
-          <p:cNvPr id="24" name="Title 1">
-            <a:extLst>
-              <a:ext uri="{FF2B5EF4-FFF2-40B4-BE49-F238E27FC236}">
-                <a16:creationId xmlns:a16="http://schemas.microsoft.com/office/drawing/2014/main" id="{CF0EFEFF-05BF-441B-B445-DB501F7C6059}"/>
-              </a:ext>
-            </a:extLst>
-          </p:cNvPr>
-          <p:cNvSpPr txBox="1">
-            <a:spLocks/>
-          </p:cNvSpPr>
-          <p:nvPr/>
-        </p:nvSpPr>
-        <p:spPr>
-          <a:xfrm>
-            <a:off x="7994059" y="6149758"/>
-            <a:ext cx="1855876" cy="351641"/>
-          </a:xfrm>
-          <a:prstGeom prst="rect">
-            <a:avLst/>
-          </a:prstGeom>
-        </p:spPr>
-        <p:txBody>
-          <a:bodyPr vert="horz" lIns="0" tIns="0" rIns="0" bIns="0" rtlCol="0" anchor="ctr">
-            <a:noAutofit/>
-          </a:bodyPr>
-          <a:lstStyle>
-            <a:lvl1pPr algn="l" defTabSz="914400" rtl="0" eaLnBrk="1" latinLnBrk="0" hangingPunct="1">
-              <a:lnSpc>
-                <a:spcPct val="90000"/>
-              </a:lnSpc>
-              <a:spcBef>
-                <a:spcPct val="0"/>
-              </a:spcBef>
-              <a:buNone/>
-              <a:defRPr sz="3200" kern="1200">
-                <a:solidFill>
-                  <a:schemeClr val="tx1">
-                    <a:lumMod val="75000"/>
-                    <a:lumOff val="25000"/>
-                  </a:schemeClr>
-                </a:solidFill>
-                <a:latin typeface="+mj-lt"/>
-                <a:ea typeface="+mj-ea"/>
-                <a:cs typeface="+mj-cs"/>
-              </a:defRPr>
-            </a:lvl1pPr>
-          </a:lstStyle>
-          <a:p>
-            <a:r>
-              <a:rPr lang="en-US" sz="1600" dirty="0"/>
-              <a:t>Age Group: Above 65</a:t>
             </a:r>
           </a:p>
         </p:txBody>
@@ -34728,7 +33182,7 @@
         </p:nvSpPr>
         <p:spPr>
           <a:xfrm>
-            <a:off x="5168062" y="5732507"/>
+            <a:off x="5168062" y="5500620"/>
             <a:ext cx="1855876" cy="351641"/>
           </a:xfrm>
           <a:prstGeom prst="rect">
@@ -35149,8 +33603,8 @@
         </p:nvSpPr>
         <p:spPr>
           <a:xfrm>
-            <a:off x="431800" y="1539556"/>
-            <a:ext cx="5472000" cy="360000"/>
+            <a:off x="420000" y="953629"/>
+            <a:ext cx="7427860" cy="360000"/>
           </a:xfrm>
         </p:spPr>
         <p:txBody>
@@ -35159,41 +33613,11 @@
           <a:p>
             <a:r>
               <a:rPr lang="en-US" dirty="0"/>
-              <a:t>OLS with Forward Regression</a:t>
-            </a:r>
-          </a:p>
-        </p:txBody>
-      </p:sp>
-      <p:sp>
-        <p:nvSpPr>
-          <p:cNvPr id="6" name="Text Placeholder 5">
-            <a:extLst>
-              <a:ext uri="{FF2B5EF4-FFF2-40B4-BE49-F238E27FC236}">
-                <a16:creationId xmlns:a16="http://schemas.microsoft.com/office/drawing/2014/main" id="{B237D1CA-B91A-410E-A968-D017BBE99F99}"/>
-              </a:ext>
-            </a:extLst>
-          </p:cNvPr>
-          <p:cNvSpPr>
-            <a:spLocks noGrp="1"/>
-          </p:cNvSpPr>
-          <p:nvPr>
-            <p:ph type="body" sz="quarter" idx="13"/>
-          </p:nvPr>
-        </p:nvSpPr>
-        <p:spPr>
-          <a:xfrm>
-            <a:off x="6185318" y="1539556"/>
-            <a:ext cx="5472000" cy="358775"/>
-          </a:xfrm>
-        </p:spPr>
-        <p:txBody>
-          <a:bodyPr/>
-          <a:lstStyle/>
-          <a:p>
-            <a:r>
-              <a:rPr lang="en-US" dirty="0"/>
-              <a:t>Bayesian Regression</a:t>
-            </a:r>
+              <a:t>OLS with Forward Regression Vs Bayesian Regression</a:t>
+            </a:r>
+          </a:p>
+          <a:p>
+            <a:endParaRPr lang="en-US" dirty="0"/>
           </a:p>
         </p:txBody>
       </p:sp>
@@ -35227,66 +33651,124 @@
           </a:p>
         </p:txBody>
       </p:sp>
-      <p:pic>
-        <p:nvPicPr>
-          <p:cNvPr id="9" name="Picture 8" descr="A screenshot of a cell phone&#10;&#10;Description automatically generated">
-            <a:extLst>
-              <a:ext uri="{FF2B5EF4-FFF2-40B4-BE49-F238E27FC236}">
-                <a16:creationId xmlns:a16="http://schemas.microsoft.com/office/drawing/2014/main" id="{376C12E7-38AB-49D3-84E1-4FAF5EE14190}"/>
-              </a:ext>
-            </a:extLst>
-          </p:cNvPr>
-          <p:cNvPicPr>
-            <a:picLocks noChangeAspect="1"/>
-          </p:cNvPicPr>
+      <p:sp>
+        <p:nvSpPr>
+          <p:cNvPr id="5" name="Rectangle 4">
+            <a:extLst>
+              <a:ext uri="{FF2B5EF4-FFF2-40B4-BE49-F238E27FC236}">
+                <a16:creationId xmlns:a16="http://schemas.microsoft.com/office/drawing/2014/main" id="{89C9BEC0-059D-4063-A24F-E881D0D24A52}"/>
+              </a:ext>
+            </a:extLst>
+          </p:cNvPr>
+          <p:cNvSpPr/>
           <p:nvPr/>
-        </p:nvPicPr>
-        <p:blipFill>
-          <a:blip r:embed="rId2"/>
-          <a:stretch>
-            <a:fillRect/>
-          </a:stretch>
-        </p:blipFill>
+        </p:nvSpPr>
         <p:spPr>
           <a:xfrm>
-            <a:off x="366895" y="2253090"/>
-            <a:ext cx="5601810" cy="2635062"/>
+            <a:off x="337351" y="1461346"/>
+            <a:ext cx="9774315" cy="3970318"/>
           </a:xfrm>
           <a:prstGeom prst="rect">
             <a:avLst/>
           </a:prstGeom>
         </p:spPr>
-      </p:pic>
-      <p:pic>
-        <p:nvPicPr>
-          <p:cNvPr id="10" name="Picture 9">
-            <a:extLst>
-              <a:ext uri="{FF2B5EF4-FFF2-40B4-BE49-F238E27FC236}">
-                <a16:creationId xmlns:a16="http://schemas.microsoft.com/office/drawing/2014/main" id="{E1CB3093-EA23-4BD0-947B-9E1CFED017E5}"/>
-              </a:ext>
-            </a:extLst>
-          </p:cNvPr>
-          <p:cNvPicPr>
-            <a:picLocks noChangeAspect="1"/>
-          </p:cNvPicPr>
-          <p:nvPr/>
-        </p:nvPicPr>
-        <p:blipFill>
-          <a:blip r:embed="rId3"/>
-          <a:stretch>
-            <a:fillRect/>
-          </a:stretch>
-        </p:blipFill>
-        <p:spPr>
-          <a:xfrm>
-            <a:off x="4915319" y="3229093"/>
-            <a:ext cx="6909786" cy="1981081"/>
-          </a:xfrm>
-          <a:prstGeom prst="rect">
-            <a:avLst/>
-          </a:prstGeom>
-        </p:spPr>
-      </p:pic>
+        <p:txBody>
+          <a:bodyPr wrap="square">
+            <a:spAutoFit/>
+          </a:bodyPr>
+          <a:lstStyle/>
+          <a:p>
+            <a:r>
+              <a:rPr lang="en-US" sz="1200" dirty="0"/>
+              <a:t>As we can see from above, coefficients from both regression models are very close. Below is a summary of comparison:</a:t>
+            </a:r>
+          </a:p>
+          <a:p>
+            <a:pPr marL="171450" lvl="0" indent="-171450">
+              <a:buFont typeface="Arial" panose="020B0604020202020204" pitchFamily="34" charset="0"/>
+              <a:buChar char="•"/>
+            </a:pPr>
+            <a:r>
+              <a:rPr lang="en-US" sz="1200" b="1" dirty="0"/>
+              <a:t>Below 25 Age Group:</a:t>
+            </a:r>
+            <a:r>
+              <a:rPr lang="en-US" sz="1200" dirty="0"/>
+              <a:t> Coefficient for Age from OLS is 4.0296, which is very close to Age coefficient of 4.03 from Bayesian Regression. Coefficient for Annual Income from OLS is (-0.6769), which is very close to the -0.6769 value from Bayesian Regression. Overall, shows a very similar dependency on Age and Annual Income in this group.</a:t>
+            </a:r>
+          </a:p>
+          <a:p>
+            <a:pPr marL="171450" lvl="0" indent="-171450">
+              <a:buFont typeface="Arial" panose="020B0604020202020204" pitchFamily="34" charset="0"/>
+              <a:buChar char="•"/>
+            </a:pPr>
+            <a:r>
+              <a:rPr lang="en-US" sz="1200" b="1" dirty="0"/>
+              <a:t>26 – 35 Age Group: </a:t>
+            </a:r>
+            <a:r>
+              <a:rPr lang="en-US" sz="1200" dirty="0"/>
+              <a:t>Coefficient for Age from OLS is 1.6762, which is very close to Age coefficient of 1.68 from Bayesian Regression. Coefficient for Annual Income from OLS is 0.1718, which is very close to the 0.17 value from Bayesian Regression. Overall, shows a very similar dependency on Age and Annual Income in this group.</a:t>
+            </a:r>
+          </a:p>
+          <a:p>
+            <a:pPr marL="171450" lvl="0" indent="-171450">
+              <a:buFont typeface="Arial" panose="020B0604020202020204" pitchFamily="34" charset="0"/>
+              <a:buChar char="•"/>
+            </a:pPr>
+            <a:r>
+              <a:rPr lang="en-US" sz="1200" b="1" dirty="0"/>
+              <a:t>36 – 45 Age Group: </a:t>
+            </a:r>
+            <a:r>
+              <a:rPr lang="en-US" sz="1200" dirty="0"/>
+              <a:t>Coefficient for Age from OLS is 0.5828, which is very close to Age coefficient of 0.58 from Bayesian Regression. Coefficient for Annual Income from OLS is 0.2917, which is very close to the 0.29 value from Bayesian Regression. Overall, shows a very similar dependency on Age and Annual Income in this group.</a:t>
+            </a:r>
+          </a:p>
+          <a:p>
+            <a:pPr marL="171450" lvl="0" indent="-171450">
+              <a:buFont typeface="Arial" panose="020B0604020202020204" pitchFamily="34" charset="0"/>
+              <a:buChar char="•"/>
+            </a:pPr>
+            <a:r>
+              <a:rPr lang="en-US" sz="1200" b="1" dirty="0"/>
+              <a:t>46 – 55 Age Group: </a:t>
+            </a:r>
+            <a:r>
+              <a:rPr lang="en-US" sz="1200" dirty="0"/>
+              <a:t>Coefficient for Age from OLS is 0.7401, which is only different from Age coefficient of 0.84 from Bayesian Regression by 0.09 units. OLS regression for this age group does not use Annual Income as one of the independent variables, determined by forward selection. However, in Bayesian Regression we have used both age and annual income. Coefficient for Annual Income is -0.09 from Bayesian Regression, indicating a very minimal and a negative dependency of spending score on annual income. Overall both models show very similar results.</a:t>
+            </a:r>
+          </a:p>
+          <a:p>
+            <a:pPr marL="171450" lvl="0" indent="-171450">
+              <a:buFont typeface="Arial" panose="020B0604020202020204" pitchFamily="34" charset="0"/>
+              <a:buChar char="•"/>
+            </a:pPr>
+            <a:r>
+              <a:rPr lang="en-US" sz="1200" b="1" dirty="0"/>
+              <a:t>56 – 65 Age Group: </a:t>
+            </a:r>
+            <a:r>
+              <a:rPr lang="en-US" sz="1200" dirty="0"/>
+              <a:t>Coefficient for Age from OLS is 0.5358, which is very close to Age coefficient of 0.54 from Bayesian Regression. OLS regression for this age group does not use Annual Income as one of the independent variables, determined by forward selection. However, in Bayesian Regression we have used both age and annual income. Coefficient for Annual Income is -0.01 from Bayesian Regression, indicating a very minimal and a negative dependency of spending score on annual income. Overall, both models show very similar results.</a:t>
+            </a:r>
+          </a:p>
+          <a:p>
+            <a:pPr marL="171450" lvl="0" indent="-171450">
+              <a:buFont typeface="Arial" panose="020B0604020202020204" pitchFamily="34" charset="0"/>
+              <a:buChar char="•"/>
+            </a:pPr>
+            <a:r>
+              <a:rPr lang="en-US" sz="1200" b="1" dirty="0"/>
+              <a:t>Above 65 Age Group: </a:t>
+            </a:r>
+            <a:r>
+              <a:rPr lang="en-US" sz="1200" dirty="0"/>
+              <a:t>Coefficient for Age from OLS is 0.2173, which is very close to Age coefficient of 0.22 from Bayesian Regression. Coefficient for Annual Income from OLS is 0.6344, which is very close to the 0.63 value from Bayesian Regression. Overall, shows a very similar dependency on Age and Annual Income in this group.</a:t>
+            </a:r>
+          </a:p>
+        </p:txBody>
+      </p:sp>
     </p:spTree>
     <p:extLst>
       <p:ext uri="{BB962C8B-B14F-4D97-AF65-F5344CB8AC3E}">
@@ -40124,20 +38606,20 @@
 </file>
 
 <file path=customXml/item1.xml><?xml version="1.0" encoding="utf-8"?>
+<p:properties xmlns:p="http://schemas.microsoft.com/office/2006/metadata/properties" xmlns:xsi="http://www.w3.org/2001/XMLSchema-instance" xmlns:pc="http://schemas.microsoft.com/office/infopath/2007/PartnerControls">
+  <documentManagement>
+    <MediaServiceKeyPoints xmlns="71af3243-3dd4-4a8d-8c0d-dd76da1f02a5" xsi:nil="true"/>
+  </documentManagement>
+</p:properties>
+</file>
+
+<file path=customXml/item2.xml><?xml version="1.0" encoding="utf-8"?>
 <?mso-contentType ?>
 <FormTemplates xmlns="http://schemas.microsoft.com/sharepoint/v3/contenttype/forms">
   <Display>DocumentLibraryForm</Display>
   <Edit>DocumentLibraryForm</Edit>
   <New>DocumentLibraryForm</New>
 </FormTemplates>
-</file>
-
-<file path=customXml/item2.xml><?xml version="1.0" encoding="utf-8"?>
-<p:properties xmlns:p="http://schemas.microsoft.com/office/2006/metadata/properties" xmlns:xsi="http://www.w3.org/2001/XMLSchema-instance" xmlns:pc="http://schemas.microsoft.com/office/infopath/2007/PartnerControls">
-  <documentManagement>
-    <MediaServiceKeyPoints xmlns="71af3243-3dd4-4a8d-8c0d-dd76da1f02a5" xsi:nil="true"/>
-  </documentManagement>
-</p:properties>
 </file>
 
 <file path=customXml/item3.xml><?xml version="1.0" encoding="utf-8"?>
@@ -40352,14 +38834,6 @@
 </file>
 
 <file path=customXml/itemProps1.xml><?xml version="1.0" encoding="utf-8"?>
-<ds:datastoreItem xmlns:ds="http://schemas.openxmlformats.org/officeDocument/2006/customXml" ds:itemID="{8A930687-51F2-44C8-9CE6-D1B3D6E17522}">
-  <ds:schemaRefs>
-    <ds:schemaRef ds:uri="http://schemas.microsoft.com/sharepoint/v3/contenttype/forms"/>
-  </ds:schemaRefs>
-</ds:datastoreItem>
-</file>
-
-<file path=customXml/itemProps2.xml><?xml version="1.0" encoding="utf-8"?>
 <ds:datastoreItem xmlns:ds="http://schemas.openxmlformats.org/officeDocument/2006/customXml" ds:itemID="{A861FE8A-8F15-409F-AF62-619C69C0D537}">
   <ds:schemaRefs>
     <ds:schemaRef ds:uri="http://purl.org/dc/elements/1.1/"/>
@@ -40372,6 +38846,14 @@
     <ds:schemaRef ds:uri="71af3243-3dd4-4a8d-8c0d-dd76da1f02a5"/>
     <ds:schemaRef ds:uri="http://www.w3.org/XML/1998/namespace"/>
     <ds:schemaRef ds:uri="http://purl.org/dc/dcmitype/"/>
+  </ds:schemaRefs>
+</ds:datastoreItem>
+</file>
+
+<file path=customXml/itemProps2.xml><?xml version="1.0" encoding="utf-8"?>
+<ds:datastoreItem xmlns:ds="http://schemas.openxmlformats.org/officeDocument/2006/customXml" ds:itemID="{8A930687-51F2-44C8-9CE6-D1B3D6E17522}">
+  <ds:schemaRefs>
+    <ds:schemaRef ds:uri="http://schemas.microsoft.com/sharepoint/v3/contenttype/forms"/>
   </ds:schemaRefs>
 </ds:datastoreItem>
 </file>

</xml_diff>